<commit_message>
Added SASS powerpoint and updated CSS powerpoint
</commit_message>
<xml_diff>
--- a/web-fundamentals/css/CSS.pptx
+++ b/web-fundamentals/css/CSS.pptx
@@ -7,17 +7,19 @@
   <p:sldIdLst>
     <p:sldId id="256" r:id="rId2"/>
     <p:sldId id="257" r:id="rId3"/>
-    <p:sldId id="258" r:id="rId4"/>
-    <p:sldId id="259" r:id="rId5"/>
-    <p:sldId id="260" r:id="rId6"/>
-    <p:sldId id="261" r:id="rId7"/>
-    <p:sldId id="262" r:id="rId8"/>
-    <p:sldId id="263" r:id="rId9"/>
-    <p:sldId id="268" r:id="rId10"/>
-    <p:sldId id="265" r:id="rId11"/>
-    <p:sldId id="267" r:id="rId12"/>
-    <p:sldId id="269" r:id="rId13"/>
-    <p:sldId id="266" r:id="rId14"/>
+    <p:sldId id="271" r:id="rId4"/>
+    <p:sldId id="258" r:id="rId5"/>
+    <p:sldId id="259" r:id="rId6"/>
+    <p:sldId id="260" r:id="rId7"/>
+    <p:sldId id="261" r:id="rId8"/>
+    <p:sldId id="262" r:id="rId9"/>
+    <p:sldId id="263" r:id="rId10"/>
+    <p:sldId id="268" r:id="rId11"/>
+    <p:sldId id="265" r:id="rId12"/>
+    <p:sldId id="267" r:id="rId13"/>
+    <p:sldId id="269" r:id="rId14"/>
+    <p:sldId id="270" r:id="rId15"/>
+    <p:sldId id="266" r:id="rId16"/>
   </p:sldIdLst>
   <p:sldSz cx="12192000" cy="6858000"/>
   <p:notesSz cx="6858000" cy="9144000"/>
@@ -4213,6 +4215,83 @@
           <a:chExt cx="0" cy="0"/>
         </a:xfrm>
       </p:grpSpPr>
+      <p:pic>
+        <p:nvPicPr>
+          <p:cNvPr id="5122" name="Picture 2" descr="CSS Position | Learn Three Sets of Properties in CSS Position">
+            <a:extLst>
+              <a:ext uri="{FF2B5EF4-FFF2-40B4-BE49-F238E27FC236}">
+                <a16:creationId xmlns:a16="http://schemas.microsoft.com/office/drawing/2014/main" id="{4B487F10-A1ED-47BA-9882-5FA552A4659D}"/>
+              </a:ext>
+            </a:extLst>
+          </p:cNvPr>
+          <p:cNvPicPr>
+            <a:picLocks noChangeAspect="1" noChangeArrowheads="1"/>
+          </p:cNvPicPr>
+          <p:nvPr/>
+        </p:nvPicPr>
+        <p:blipFill>
+          <a:blip r:embed="rId2">
+            <a:extLst>
+              <a:ext uri="{28A0092B-C50C-407E-A947-70E740481C1C}">
+                <a14:useLocalDpi xmlns:a14="http://schemas.microsoft.com/office/drawing/2010/main" val="0"/>
+              </a:ext>
+            </a:extLst>
+          </a:blip>
+          <a:srcRect/>
+          <a:stretch>
+            <a:fillRect/>
+          </a:stretch>
+        </p:blipFill>
+        <p:spPr bwMode="auto">
+          <a:xfrm>
+            <a:off x="0" y="0"/>
+            <a:ext cx="12301538" cy="6858000"/>
+          </a:xfrm>
+          <a:prstGeom prst="rect">
+            <a:avLst/>
+          </a:prstGeom>
+          <a:noFill/>
+          <a:extLst>
+            <a:ext uri="{909E8E84-426E-40DD-AFC4-6F175D3DCCD1}">
+              <a14:hiddenFill xmlns:a14="http://schemas.microsoft.com/office/drawing/2010/main">
+                <a:solidFill>
+                  <a:srgbClr val="FFFFFF"/>
+                </a:solidFill>
+              </a14:hiddenFill>
+            </a:ext>
+          </a:extLst>
+        </p:spPr>
+      </p:pic>
+    </p:spTree>
+    <p:extLst>
+      <p:ext uri="{BB962C8B-B14F-4D97-AF65-F5344CB8AC3E}">
+        <p14:creationId xmlns:p14="http://schemas.microsoft.com/office/powerpoint/2010/main" val="2009543672"/>
+      </p:ext>
+    </p:extLst>
+  </p:cSld>
+  <p:clrMapOvr>
+    <a:masterClrMapping/>
+  </p:clrMapOvr>
+</p:sld>
+</file>
+
+<file path=ppt/slides/slide11.xml><?xml version="1.0" encoding="utf-8"?>
+<p:sld xmlns:a="http://schemas.openxmlformats.org/drawingml/2006/main" xmlns:r="http://schemas.openxmlformats.org/officeDocument/2006/relationships" xmlns:p="http://schemas.openxmlformats.org/presentationml/2006/main">
+  <p:cSld>
+    <p:spTree>
+      <p:nvGrpSpPr>
+        <p:cNvPr id="1" name=""/>
+        <p:cNvGrpSpPr/>
+        <p:nvPr/>
+      </p:nvGrpSpPr>
+      <p:grpSpPr>
+        <a:xfrm>
+          <a:off x="0" y="0"/>
+          <a:ext cx="0" cy="0"/>
+          <a:chOff x="0" y="0"/>
+          <a:chExt cx="0" cy="0"/>
+        </a:xfrm>
+      </p:grpSpPr>
       <p:sp>
         <p:nvSpPr>
           <p:cNvPr id="2" name="Title 1">
@@ -4399,7 +4478,7 @@
 </p:sld>
 </file>
 
-<file path=ppt/slides/slide11.xml><?xml version="1.0" encoding="utf-8"?>
+<file path=ppt/slides/slide12.xml><?xml version="1.0" encoding="utf-8"?>
 <p:sld xmlns:a="http://schemas.openxmlformats.org/drawingml/2006/main" xmlns:r="http://schemas.openxmlformats.org/officeDocument/2006/relationships" xmlns:p="http://schemas.openxmlformats.org/presentationml/2006/main">
   <p:cSld>
     <p:bg>
@@ -4703,7 +4782,7 @@
 </p:sld>
 </file>
 
-<file path=ppt/slides/slide12.xml><?xml version="1.0" encoding="utf-8"?>
+<file path=ppt/slides/slide13.xml><?xml version="1.0" encoding="utf-8"?>
 <p:sld xmlns:a="http://schemas.openxmlformats.org/drawingml/2006/main" xmlns:r="http://schemas.openxmlformats.org/officeDocument/2006/relationships" xmlns:p="http://schemas.openxmlformats.org/presentationml/2006/main">
   <p:cSld>
     <p:bg>
@@ -5012,7 +5091,307 @@
 </p:sld>
 </file>
 
-<file path=ppt/slides/slide13.xml><?xml version="1.0" encoding="utf-8"?>
+<file path=ppt/slides/slide14.xml><?xml version="1.0" encoding="utf-8"?>
+<p:sld xmlns:a="http://schemas.openxmlformats.org/drawingml/2006/main" xmlns:r="http://schemas.openxmlformats.org/officeDocument/2006/relationships" xmlns:p="http://schemas.openxmlformats.org/presentationml/2006/main">
+  <p:cSld>
+    <p:spTree>
+      <p:nvGrpSpPr>
+        <p:cNvPr id="1" name=""/>
+        <p:cNvGrpSpPr/>
+        <p:nvPr/>
+      </p:nvGrpSpPr>
+      <p:grpSpPr>
+        <a:xfrm>
+          <a:off x="0" y="0"/>
+          <a:ext cx="0" cy="0"/>
+          <a:chOff x="0" y="0"/>
+          <a:chExt cx="0" cy="0"/>
+        </a:xfrm>
+      </p:grpSpPr>
+      <p:sp>
+        <p:nvSpPr>
+          <p:cNvPr id="2" name="Title 1">
+            <a:extLst>
+              <a:ext uri="{FF2B5EF4-FFF2-40B4-BE49-F238E27FC236}">
+                <a16:creationId xmlns:a16="http://schemas.microsoft.com/office/drawing/2014/main" id="{1AAA912E-0B65-4468-973A-E8B66F85A70D}"/>
+              </a:ext>
+            </a:extLst>
+          </p:cNvPr>
+          <p:cNvSpPr>
+            <a:spLocks noGrp="1"/>
+          </p:cNvSpPr>
+          <p:nvPr>
+            <p:ph type="title"/>
+          </p:nvPr>
+        </p:nvSpPr>
+        <p:spPr/>
+        <p:txBody>
+          <a:bodyPr/>
+          <a:lstStyle/>
+          <a:p>
+            <a:r>
+              <a:rPr lang="en-US" dirty="0"/>
+              <a:t>More Features</a:t>
+            </a:r>
+          </a:p>
+        </p:txBody>
+      </p:sp>
+      <p:sp>
+        <p:nvSpPr>
+          <p:cNvPr id="4" name="Content Placeholder 2">
+            <a:extLst>
+              <a:ext uri="{FF2B5EF4-FFF2-40B4-BE49-F238E27FC236}">
+                <a16:creationId xmlns:a16="http://schemas.microsoft.com/office/drawing/2014/main" id="{84CDAD99-0E16-4E99-AD1D-B41D2C9CCDA7}"/>
+              </a:ext>
+            </a:extLst>
+          </p:cNvPr>
+          <p:cNvSpPr txBox="1">
+            <a:spLocks/>
+          </p:cNvSpPr>
+          <p:nvPr/>
+        </p:nvSpPr>
+        <p:spPr>
+          <a:xfrm>
+            <a:off x="421958" y="2659570"/>
+            <a:ext cx="11250930" cy="3593592"/>
+          </a:xfrm>
+          <a:prstGeom prst="rect">
+            <a:avLst/>
+          </a:prstGeom>
+        </p:spPr>
+        <p:txBody>
+          <a:bodyPr vert="horz" lIns="91440" tIns="45720" rIns="91440" bIns="45720" rtlCol="0">
+            <a:normAutofit/>
+          </a:bodyPr>
+          <a:lstStyle>
+            <a:lvl1pPr marL="0" indent="0" algn="l" defTabSz="914400" rtl="0" eaLnBrk="1" latinLnBrk="0" hangingPunct="1">
+              <a:lnSpc>
+                <a:spcPct val="101000"/>
+              </a:lnSpc>
+              <a:spcBef>
+                <a:spcPts val="700"/>
+              </a:spcBef>
+              <a:spcAft>
+                <a:spcPts val="700"/>
+              </a:spcAft>
+              <a:buFont typeface="Arial" panose="020B0604020202020204" pitchFamily="34" charset="0"/>
+              <a:buNone/>
+              <a:defRPr sz="2600" kern="1200" spc="50" baseline="0">
+                <a:solidFill>
+                  <a:schemeClr val="tx1"/>
+                </a:solidFill>
+                <a:latin typeface="+mn-lt"/>
+                <a:ea typeface="+mn-ea"/>
+                <a:cs typeface="+mn-cs"/>
+              </a:defRPr>
+            </a:lvl1pPr>
+            <a:lvl2pPr marL="274320" indent="-274320" algn="l" defTabSz="914400" rtl="0" eaLnBrk="1" latinLnBrk="0" hangingPunct="1">
+              <a:lnSpc>
+                <a:spcPct val="101000"/>
+              </a:lnSpc>
+              <a:spcBef>
+                <a:spcPts val="400"/>
+              </a:spcBef>
+              <a:spcAft>
+                <a:spcPts val="400"/>
+              </a:spcAft>
+              <a:buClrTx/>
+              <a:buFont typeface="Wingdings" panose="05000000000000000000" pitchFamily="2" charset="2"/>
+              <a:buChar char="§"/>
+              <a:defRPr sz="2300" kern="1200" spc="50" baseline="0">
+                <a:solidFill>
+                  <a:schemeClr val="tx1"/>
+                </a:solidFill>
+                <a:latin typeface="+mn-lt"/>
+                <a:ea typeface="+mn-ea"/>
+                <a:cs typeface="+mn-cs"/>
+              </a:defRPr>
+            </a:lvl2pPr>
+            <a:lvl3pPr marL="274320" indent="0" algn="l" defTabSz="914400" rtl="0" eaLnBrk="1" latinLnBrk="0" hangingPunct="1">
+              <a:lnSpc>
+                <a:spcPct val="101000"/>
+              </a:lnSpc>
+              <a:spcBef>
+                <a:spcPts val="400"/>
+              </a:spcBef>
+              <a:spcAft>
+                <a:spcPts val="400"/>
+              </a:spcAft>
+              <a:buFont typeface="Arial" panose="020B0604020202020204" pitchFamily="34" charset="0"/>
+              <a:buNone/>
+              <a:defRPr sz="1800" b="1" kern="1200" spc="50" baseline="0">
+                <a:solidFill>
+                  <a:schemeClr val="tx1"/>
+                </a:solidFill>
+                <a:latin typeface="+mn-lt"/>
+                <a:ea typeface="+mn-ea"/>
+                <a:cs typeface="+mn-cs"/>
+              </a:defRPr>
+            </a:lvl3pPr>
+            <a:lvl4pPr marL="594360" indent="-274320" algn="l" defTabSz="914400" rtl="0" eaLnBrk="1" latinLnBrk="0" hangingPunct="1">
+              <a:lnSpc>
+                <a:spcPct val="101000"/>
+              </a:lnSpc>
+              <a:spcBef>
+                <a:spcPts val="400"/>
+              </a:spcBef>
+              <a:spcAft>
+                <a:spcPts val="400"/>
+              </a:spcAft>
+              <a:buClrTx/>
+              <a:buFont typeface="Wingdings" panose="05000000000000000000" pitchFamily="2" charset="2"/>
+              <a:buChar char="§"/>
+              <a:defRPr sz="1800" kern="1200" spc="50" baseline="0">
+                <a:solidFill>
+                  <a:schemeClr val="tx1"/>
+                </a:solidFill>
+                <a:latin typeface="+mn-lt"/>
+                <a:ea typeface="+mn-ea"/>
+                <a:cs typeface="+mn-cs"/>
+              </a:defRPr>
+            </a:lvl4pPr>
+            <a:lvl5pPr marL="594360" indent="0" algn="l" defTabSz="914400" rtl="0" eaLnBrk="1" latinLnBrk="0" hangingPunct="1">
+              <a:lnSpc>
+                <a:spcPct val="101000"/>
+              </a:lnSpc>
+              <a:spcBef>
+                <a:spcPts val="400"/>
+              </a:spcBef>
+              <a:spcAft>
+                <a:spcPts val="400"/>
+              </a:spcAft>
+              <a:buFont typeface="Arial" panose="020B0604020202020204" pitchFamily="34" charset="0"/>
+              <a:buNone/>
+              <a:defRPr sz="1800" b="1" kern="1200" spc="50" baseline="0">
+                <a:solidFill>
+                  <a:schemeClr val="tx1"/>
+                </a:solidFill>
+                <a:latin typeface="+mn-lt"/>
+                <a:ea typeface="+mn-ea"/>
+                <a:cs typeface="+mn-cs"/>
+              </a:defRPr>
+            </a:lvl5pPr>
+            <a:lvl6pPr marL="2514600" indent="-228600" algn="l" defTabSz="914400" rtl="0" eaLnBrk="1" latinLnBrk="0" hangingPunct="1">
+              <a:lnSpc>
+                <a:spcPct val="90000"/>
+              </a:lnSpc>
+              <a:spcBef>
+                <a:spcPts val="500"/>
+              </a:spcBef>
+              <a:buFont typeface="Arial" panose="020B0604020202020204" pitchFamily="34" charset="0"/>
+              <a:buChar char="•"/>
+              <a:defRPr sz="1800" kern="1200">
+                <a:solidFill>
+                  <a:schemeClr val="tx1"/>
+                </a:solidFill>
+                <a:latin typeface="+mn-lt"/>
+                <a:ea typeface="+mn-ea"/>
+                <a:cs typeface="+mn-cs"/>
+              </a:defRPr>
+            </a:lvl6pPr>
+            <a:lvl7pPr marL="2971800" indent="-228600" algn="l" defTabSz="914400" rtl="0" eaLnBrk="1" latinLnBrk="0" hangingPunct="1">
+              <a:lnSpc>
+                <a:spcPct val="90000"/>
+              </a:lnSpc>
+              <a:spcBef>
+                <a:spcPts val="500"/>
+              </a:spcBef>
+              <a:buFont typeface="Arial" panose="020B0604020202020204" pitchFamily="34" charset="0"/>
+              <a:buChar char="•"/>
+              <a:defRPr sz="1800" kern="1200">
+                <a:solidFill>
+                  <a:schemeClr val="tx1"/>
+                </a:solidFill>
+                <a:latin typeface="+mn-lt"/>
+                <a:ea typeface="+mn-ea"/>
+                <a:cs typeface="+mn-cs"/>
+              </a:defRPr>
+            </a:lvl7pPr>
+            <a:lvl8pPr marL="3429000" indent="-228600" algn="l" defTabSz="914400" rtl="0" eaLnBrk="1" latinLnBrk="0" hangingPunct="1">
+              <a:lnSpc>
+                <a:spcPct val="90000"/>
+              </a:lnSpc>
+              <a:spcBef>
+                <a:spcPts val="500"/>
+              </a:spcBef>
+              <a:buFont typeface="Arial" panose="020B0604020202020204" pitchFamily="34" charset="0"/>
+              <a:buChar char="•"/>
+              <a:defRPr sz="1800" kern="1200">
+                <a:solidFill>
+                  <a:schemeClr val="tx1"/>
+                </a:solidFill>
+                <a:latin typeface="+mn-lt"/>
+                <a:ea typeface="+mn-ea"/>
+                <a:cs typeface="+mn-cs"/>
+              </a:defRPr>
+            </a:lvl8pPr>
+            <a:lvl9pPr marL="3886200" indent="-228600" algn="l" defTabSz="914400" rtl="0" eaLnBrk="1" latinLnBrk="0" hangingPunct="1">
+              <a:lnSpc>
+                <a:spcPct val="90000"/>
+              </a:lnSpc>
+              <a:spcBef>
+                <a:spcPts val="500"/>
+              </a:spcBef>
+              <a:buFont typeface="Arial" panose="020B0604020202020204" pitchFamily="34" charset="0"/>
+              <a:buChar char="•"/>
+              <a:defRPr sz="1800" kern="1200">
+                <a:solidFill>
+                  <a:schemeClr val="tx1"/>
+                </a:solidFill>
+                <a:latin typeface="+mn-lt"/>
+                <a:ea typeface="+mn-ea"/>
+                <a:cs typeface="+mn-cs"/>
+              </a:defRPr>
+            </a:lvl9pPr>
+          </a:lstStyle>
+          <a:p>
+            <a:pPr marL="457200" indent="-457200">
+              <a:lnSpc>
+                <a:spcPct val="100000"/>
+              </a:lnSpc>
+              <a:spcAft>
+                <a:spcPts val="0"/>
+              </a:spcAft>
+              <a:buFont typeface="Arial" panose="020B0604020202020204" pitchFamily="34" charset="0"/>
+              <a:buChar char="•"/>
+            </a:pPr>
+            <a:r>
+              <a:rPr lang="en-US" dirty="0"/>
+              <a:t>Custom Properties</a:t>
+            </a:r>
+          </a:p>
+          <a:p>
+            <a:pPr marL="457200" indent="-457200">
+              <a:lnSpc>
+                <a:spcPct val="100000"/>
+              </a:lnSpc>
+              <a:spcAft>
+                <a:spcPts val="0"/>
+              </a:spcAft>
+              <a:buFont typeface="Arial" panose="020B0604020202020204" pitchFamily="34" charset="0"/>
+              <a:buChar char="•"/>
+            </a:pPr>
+            <a:r>
+              <a:rPr lang="en-US" dirty="0"/>
+              <a:t>Animations</a:t>
+            </a:r>
+          </a:p>
+        </p:txBody>
+      </p:sp>
+    </p:spTree>
+    <p:extLst>
+      <p:ext uri="{BB962C8B-B14F-4D97-AF65-F5344CB8AC3E}">
+        <p14:creationId xmlns:p14="http://schemas.microsoft.com/office/powerpoint/2010/main" val="3953940780"/>
+      </p:ext>
+    </p:extLst>
+  </p:cSld>
+  <p:clrMapOvr>
+    <a:masterClrMapping/>
+  </p:clrMapOvr>
+</p:sld>
+</file>
+
+<file path=ppt/slides/slide15.xml><?xml version="1.0" encoding="utf-8"?>
 <p:sld xmlns:a="http://schemas.openxmlformats.org/drawingml/2006/main" xmlns:r="http://schemas.openxmlformats.org/officeDocument/2006/relationships" xmlns:p="http://schemas.openxmlformats.org/presentationml/2006/main">
   <p:cSld>
     <p:spTree>
@@ -5440,191 +5819,57 @@
           <a:chExt cx="0" cy="0"/>
         </a:xfrm>
       </p:grpSpPr>
-      <p:sp>
-        <p:nvSpPr>
-          <p:cNvPr id="2" name="Title 1">
-            <a:extLst>
-              <a:ext uri="{FF2B5EF4-FFF2-40B4-BE49-F238E27FC236}">
-                <a16:creationId xmlns:a16="http://schemas.microsoft.com/office/drawing/2014/main" id="{1AAA912E-0B65-4468-973A-E8B66F85A70D}"/>
-              </a:ext>
-            </a:extLst>
-          </p:cNvPr>
-          <p:cNvSpPr>
-            <a:spLocks noGrp="1"/>
-          </p:cNvSpPr>
-          <p:nvPr>
-            <p:ph type="title"/>
-          </p:nvPr>
-        </p:nvSpPr>
-        <p:spPr/>
-        <p:txBody>
-          <a:bodyPr/>
-          <a:lstStyle/>
-          <a:p>
-            <a:r>
-              <a:rPr lang="en-US" dirty="0"/>
-              <a:t>Syntax</a:t>
-            </a:r>
-          </a:p>
-        </p:txBody>
-      </p:sp>
-      <p:sp>
-        <p:nvSpPr>
-          <p:cNvPr id="3" name="Content Placeholder 2">
-            <a:extLst>
-              <a:ext uri="{FF2B5EF4-FFF2-40B4-BE49-F238E27FC236}">
-                <a16:creationId xmlns:a16="http://schemas.microsoft.com/office/drawing/2014/main" id="{B2857673-E02D-4132-9857-5DB12A5F3765}"/>
-              </a:ext>
-            </a:extLst>
-          </p:cNvPr>
-          <p:cNvSpPr>
-            <a:spLocks noGrp="1"/>
-          </p:cNvSpPr>
-          <p:nvPr>
-            <p:ph idx="1"/>
-          </p:nvPr>
-        </p:nvSpPr>
-        <p:spPr/>
-        <p:txBody>
-          <a:bodyPr/>
-          <a:lstStyle/>
-          <a:p>
-            <a:pPr>
-              <a:lnSpc>
-                <a:spcPct val="100000"/>
-              </a:lnSpc>
-              <a:spcAft>
-                <a:spcPts val="0"/>
-              </a:spcAft>
-            </a:pPr>
-            <a:r>
-              <a:rPr lang="en-US" dirty="0">
+      <p:pic>
+        <p:nvPicPr>
+          <p:cNvPr id="1026" name="Picture 2" descr="CSS: ProgrammerHumor">
+            <a:extLst>
+              <a:ext uri="{FF2B5EF4-FFF2-40B4-BE49-F238E27FC236}">
+                <a16:creationId xmlns:a16="http://schemas.microsoft.com/office/drawing/2014/main" id="{57A11DDD-AD36-47EA-8A37-A51A1257D636}"/>
+              </a:ext>
+            </a:extLst>
+          </p:cNvPr>
+          <p:cNvPicPr>
+            <a:picLocks noChangeAspect="1" noChangeArrowheads="1"/>
+          </p:cNvPicPr>
+          <p:nvPr/>
+        </p:nvPicPr>
+        <p:blipFill>
+          <a:blip r:embed="rId2">
+            <a:extLst>
+              <a:ext uri="{28A0092B-C50C-407E-A947-70E740481C1C}">
+                <a14:useLocalDpi xmlns:a14="http://schemas.microsoft.com/office/drawing/2010/main" val="0"/>
+              </a:ext>
+            </a:extLst>
+          </a:blip>
+          <a:srcRect/>
+          <a:stretch>
+            <a:fillRect/>
+          </a:stretch>
+        </p:blipFill>
+        <p:spPr bwMode="auto">
+          <a:xfrm>
+            <a:off x="745331" y="0"/>
+            <a:ext cx="10701337" cy="6858000"/>
+          </a:xfrm>
+          <a:prstGeom prst="rect">
+            <a:avLst/>
+          </a:prstGeom>
+          <a:noFill/>
+          <a:extLst>
+            <a:ext uri="{909E8E84-426E-40DD-AFC4-6F175D3DCCD1}">
+              <a14:hiddenFill xmlns:a14="http://schemas.microsoft.com/office/drawing/2010/main">
                 <a:solidFill>
-                  <a:srgbClr val="FFC000"/>
+                  <a:srgbClr val="FFFFFF"/>
                 </a:solidFill>
-              </a:rPr>
-              <a:t>selector</a:t>
-            </a:r>
-            <a:r>
-              <a:rPr lang="en-US" dirty="0"/>
-              <a:t> {</a:t>
-            </a:r>
-          </a:p>
-          <a:p>
-            <a:pPr>
-              <a:lnSpc>
-                <a:spcPct val="100000"/>
-              </a:lnSpc>
-              <a:spcAft>
-                <a:spcPts val="0"/>
-              </a:spcAft>
-            </a:pPr>
-            <a:r>
-              <a:rPr lang="en-US" dirty="0"/>
-              <a:t>	</a:t>
-            </a:r>
-            <a:r>
-              <a:rPr lang="en-US" dirty="0">
-                <a:solidFill>
-                  <a:srgbClr val="0070C0"/>
-                </a:solidFill>
-              </a:rPr>
-              <a:t>property</a:t>
-            </a:r>
-            <a:r>
-              <a:rPr lang="en-US" dirty="0"/>
-              <a:t>: value;</a:t>
-            </a:r>
-          </a:p>
-          <a:p>
-            <a:pPr>
-              <a:lnSpc>
-                <a:spcPct val="100000"/>
-              </a:lnSpc>
-              <a:spcAft>
-                <a:spcPts val="0"/>
-              </a:spcAft>
-            </a:pPr>
-            <a:r>
-              <a:rPr lang="en-US" dirty="0"/>
-              <a:t>	</a:t>
-            </a:r>
-            <a:r>
-              <a:rPr lang="en-US" dirty="0">
-                <a:solidFill>
-                  <a:srgbClr val="0070C0"/>
-                </a:solidFill>
-              </a:rPr>
-              <a:t>property</a:t>
-            </a:r>
-            <a:r>
-              <a:rPr lang="en-US" dirty="0"/>
-              <a:t>: value;</a:t>
-            </a:r>
-          </a:p>
-          <a:p>
-            <a:pPr>
-              <a:lnSpc>
-                <a:spcPct val="100000"/>
-              </a:lnSpc>
-              <a:spcAft>
-                <a:spcPts val="0"/>
-              </a:spcAft>
-            </a:pPr>
-            <a:r>
-              <a:rPr lang="en-US" dirty="0"/>
-              <a:t>}</a:t>
-            </a:r>
-          </a:p>
-          <a:p>
-            <a:pPr>
-              <a:lnSpc>
-                <a:spcPct val="100000"/>
-              </a:lnSpc>
-              <a:spcAft>
-                <a:spcPts val="0"/>
-              </a:spcAft>
-            </a:pPr>
-            <a:endParaRPr lang="en-US" dirty="0"/>
-          </a:p>
-          <a:p>
-            <a:pPr marL="457200" indent="-457200">
-              <a:lnSpc>
-                <a:spcPct val="100000"/>
-              </a:lnSpc>
-              <a:spcAft>
-                <a:spcPts val="0"/>
-              </a:spcAft>
-              <a:buFont typeface="Arial" panose="020B0604020202020204" pitchFamily="34" charset="0"/>
-              <a:buChar char="•"/>
-            </a:pPr>
-            <a:r>
-              <a:rPr lang="en-US" dirty="0"/>
-              <a:t>Selectors can be element types (ie. h1, div), ids or classes</a:t>
-            </a:r>
-          </a:p>
-          <a:p>
-            <a:pPr marL="457200" indent="-457200">
-              <a:lnSpc>
-                <a:spcPct val="100000"/>
-              </a:lnSpc>
-              <a:spcAft>
-                <a:spcPts val="0"/>
-              </a:spcAft>
-              <a:buFont typeface="Arial" panose="020B0604020202020204" pitchFamily="34" charset="0"/>
-              <a:buChar char="•"/>
-            </a:pPr>
-            <a:r>
-              <a:rPr lang="en-US" dirty="0"/>
-              <a:t>A CSS rule consists of a selector, and it's set of CSS properties </a:t>
-            </a:r>
-          </a:p>
-        </p:txBody>
-      </p:sp>
+              </a14:hiddenFill>
+            </a:ext>
+          </a:extLst>
+        </p:spPr>
+      </p:pic>
     </p:spTree>
     <p:extLst>
       <p:ext uri="{BB962C8B-B14F-4D97-AF65-F5344CB8AC3E}">
-        <p14:creationId xmlns:p14="http://schemas.microsoft.com/office/powerpoint/2010/main" val="4075952605"/>
+        <p14:creationId xmlns:p14="http://schemas.microsoft.com/office/powerpoint/2010/main" val="1454036089"/>
       </p:ext>
     </p:extLst>
   </p:cSld>
@@ -5674,7 +5919,7 @@
           <a:p>
             <a:r>
               <a:rPr lang="en-US" dirty="0"/>
-              <a:t>Specificity</a:t>
+              <a:t>Syntax</a:t>
             </a:r>
           </a:p>
         </p:txBody>
@@ -5697,10 +5942,107 @@
         </p:nvSpPr>
         <p:spPr/>
         <p:txBody>
-          <a:bodyPr>
-            <a:normAutofit/>
-          </a:bodyPr>
-          <a:lstStyle/>
+          <a:bodyPr/>
+          <a:lstStyle/>
+          <a:p>
+            <a:pPr>
+              <a:lnSpc>
+                <a:spcPct val="100000"/>
+              </a:lnSpc>
+              <a:spcAft>
+                <a:spcPts val="0"/>
+              </a:spcAft>
+            </a:pPr>
+            <a:r>
+              <a:rPr lang="en-US" dirty="0">
+                <a:solidFill>
+                  <a:srgbClr val="FFC000"/>
+                </a:solidFill>
+              </a:rPr>
+              <a:t>selector</a:t>
+            </a:r>
+            <a:r>
+              <a:rPr lang="en-US" dirty="0"/>
+              <a:t> {</a:t>
+            </a:r>
+          </a:p>
+          <a:p>
+            <a:pPr>
+              <a:lnSpc>
+                <a:spcPct val="100000"/>
+              </a:lnSpc>
+              <a:spcAft>
+                <a:spcPts val="0"/>
+              </a:spcAft>
+            </a:pPr>
+            <a:r>
+              <a:rPr lang="en-US" dirty="0"/>
+              <a:t>	</a:t>
+            </a:r>
+            <a:r>
+              <a:rPr lang="en-US" dirty="0">
+                <a:solidFill>
+                  <a:srgbClr val="0070C0"/>
+                </a:solidFill>
+              </a:rPr>
+              <a:t>property</a:t>
+            </a:r>
+            <a:r>
+              <a:rPr lang="en-US" dirty="0"/>
+              <a:t>: value;</a:t>
+            </a:r>
+          </a:p>
+          <a:p>
+            <a:pPr>
+              <a:lnSpc>
+                <a:spcPct val="100000"/>
+              </a:lnSpc>
+              <a:spcAft>
+                <a:spcPts val="0"/>
+              </a:spcAft>
+            </a:pPr>
+            <a:r>
+              <a:rPr lang="en-US" dirty="0"/>
+              <a:t>	</a:t>
+            </a:r>
+            <a:r>
+              <a:rPr lang="en-US" dirty="0">
+                <a:solidFill>
+                  <a:srgbClr val="0070C0"/>
+                </a:solidFill>
+              </a:rPr>
+              <a:t>property</a:t>
+            </a:r>
+            <a:r>
+              <a:rPr lang="en-US" dirty="0"/>
+              <a:t>: value;</a:t>
+            </a:r>
+          </a:p>
+          <a:p>
+            <a:pPr>
+              <a:lnSpc>
+                <a:spcPct val="100000"/>
+              </a:lnSpc>
+              <a:spcAft>
+                <a:spcPts val="0"/>
+              </a:spcAft>
+            </a:pPr>
+            <a:r>
+              <a:rPr lang="en-US" dirty="0"/>
+              <a:t>}</a:t>
+            </a:r>
+          </a:p>
+          <a:p>
+            <a:pPr>
+              <a:lnSpc>
+                <a:spcPct val="100000"/>
+              </a:lnSpc>
+              <a:spcAft>
+                <a:spcPts val="0"/>
+              </a:spcAft>
+            </a:pPr>
+            <a:endParaRPr lang="en-US" dirty="0"/>
+          </a:p>
           <a:p>
             <a:pPr marL="457200" indent="-457200">
               <a:lnSpc>
@@ -5714,23 +6056,7 @@
             </a:pPr>
             <a:r>
               <a:rPr lang="en-US" dirty="0"/>
-              <a:t>Refers to the relative weights of various rules</a:t>
-            </a:r>
-          </a:p>
-          <a:p>
-            <a:pPr marL="731520" lvl="1" indent="-457200">
-              <a:lnSpc>
-                <a:spcPct val="100000"/>
-              </a:lnSpc>
-              <a:spcAft>
-                <a:spcPts val="0"/>
-              </a:spcAft>
-              <a:buFont typeface="Arial" panose="020B0604020202020204" pitchFamily="34" charset="0"/>
-              <a:buChar char="•"/>
-            </a:pPr>
-            <a:r>
-              <a:rPr lang="en-US" dirty="0"/>
-              <a:t>id &gt; class &gt; element type</a:t>
+              <a:t>Selectors can be element types (ie. h1, div), ids or classes</a:t>
             </a:r>
           </a:p>
           <a:p>
@@ -5744,71 +6070,17 @@
               <a:buFont typeface="Arial" panose="020B0604020202020204" pitchFamily="34" charset="0"/>
               <a:buChar char="•"/>
             </a:pPr>
-            <a:endParaRPr lang="en-US" dirty="0"/>
-          </a:p>
-          <a:p>
-            <a:pPr marL="457200" indent="-457200">
-              <a:lnSpc>
-                <a:spcPct val="100000"/>
-              </a:lnSpc>
-              <a:spcAft>
-                <a:spcPts val="0"/>
-              </a:spcAft>
-              <a:buFont typeface="Arial" panose="020B0604020202020204" pitchFamily="34" charset="0"/>
-              <a:buChar char="•"/>
-            </a:pPr>
             <a:r>
               <a:rPr lang="en-US" dirty="0"/>
-              <a:t>Be careful choosing selectors as not to change all global styles unless purposefully</a:t>
-            </a:r>
-          </a:p>
-          <a:p>
-            <a:pPr marL="457200" indent="-457200">
-              <a:lnSpc>
-                <a:spcPct val="100000"/>
-              </a:lnSpc>
-              <a:spcAft>
-                <a:spcPts val="0"/>
-              </a:spcAft>
-              <a:buFont typeface="Arial" panose="020B0604020202020204" pitchFamily="34" charset="0"/>
-              <a:buChar char="•"/>
-            </a:pPr>
-            <a:r>
-              <a:rPr lang="en-US" dirty="0"/>
-              <a:t>Following a property value with </a:t>
-            </a:r>
-            <a:r>
-              <a:rPr lang="en-US" dirty="0">
-                <a:solidFill>
-                  <a:srgbClr val="C00000"/>
-                </a:solidFill>
-              </a:rPr>
-              <a:t>!important </a:t>
-            </a:r>
-            <a:r>
-              <a:rPr lang="en-US" dirty="0"/>
-              <a:t>can be used to overrule the specificity but should not be used lightly</a:t>
-            </a:r>
-          </a:p>
-          <a:p>
-            <a:pPr marL="457200" indent="-457200">
-              <a:lnSpc>
-                <a:spcPct val="100000"/>
-              </a:lnSpc>
-              <a:spcAft>
-                <a:spcPts val="0"/>
-              </a:spcAft>
-              <a:buFont typeface="Arial" panose="020B0604020202020204" pitchFamily="34" charset="0"/>
-              <a:buChar char="•"/>
-            </a:pPr>
-            <a:endParaRPr lang="en-US" dirty="0"/>
+              <a:t>A CSS rule consists of a selector, and it's set of CSS properties </a:t>
+            </a:r>
           </a:p>
         </p:txBody>
       </p:sp>
     </p:spTree>
     <p:extLst>
       <p:ext uri="{BB962C8B-B14F-4D97-AF65-F5344CB8AC3E}">
-        <p14:creationId xmlns:p14="http://schemas.microsoft.com/office/powerpoint/2010/main" val="879691231"/>
+        <p14:creationId xmlns:p14="http://schemas.microsoft.com/office/powerpoint/2010/main" val="4075952605"/>
       </p:ext>
     </p:extLst>
   </p:cSld>
@@ -5858,6 +6130,190 @@
           <a:p>
             <a:r>
               <a:rPr lang="en-US" dirty="0"/>
+              <a:t>Specificity</a:t>
+            </a:r>
+          </a:p>
+        </p:txBody>
+      </p:sp>
+      <p:sp>
+        <p:nvSpPr>
+          <p:cNvPr id="3" name="Content Placeholder 2">
+            <a:extLst>
+              <a:ext uri="{FF2B5EF4-FFF2-40B4-BE49-F238E27FC236}">
+                <a16:creationId xmlns:a16="http://schemas.microsoft.com/office/drawing/2014/main" id="{B2857673-E02D-4132-9857-5DB12A5F3765}"/>
+              </a:ext>
+            </a:extLst>
+          </p:cNvPr>
+          <p:cNvSpPr>
+            <a:spLocks noGrp="1"/>
+          </p:cNvSpPr>
+          <p:nvPr>
+            <p:ph idx="1"/>
+          </p:nvPr>
+        </p:nvSpPr>
+        <p:spPr/>
+        <p:txBody>
+          <a:bodyPr>
+            <a:normAutofit/>
+          </a:bodyPr>
+          <a:lstStyle/>
+          <a:p>
+            <a:pPr marL="457200" indent="-457200">
+              <a:lnSpc>
+                <a:spcPct val="100000"/>
+              </a:lnSpc>
+              <a:spcAft>
+                <a:spcPts val="0"/>
+              </a:spcAft>
+              <a:buFont typeface="Arial" panose="020B0604020202020204" pitchFamily="34" charset="0"/>
+              <a:buChar char="•"/>
+            </a:pPr>
+            <a:r>
+              <a:rPr lang="en-US" dirty="0"/>
+              <a:t>Refers to the relative weights of various rules</a:t>
+            </a:r>
+          </a:p>
+          <a:p>
+            <a:pPr marL="731520" lvl="1" indent="-457200">
+              <a:lnSpc>
+                <a:spcPct val="100000"/>
+              </a:lnSpc>
+              <a:spcAft>
+                <a:spcPts val="0"/>
+              </a:spcAft>
+              <a:buFont typeface="Arial" panose="020B0604020202020204" pitchFamily="34" charset="0"/>
+              <a:buChar char="•"/>
+            </a:pPr>
+            <a:r>
+              <a:rPr lang="en-US" dirty="0"/>
+              <a:t>id &gt; class &gt; element type</a:t>
+            </a:r>
+          </a:p>
+          <a:p>
+            <a:pPr marL="457200" indent="-457200">
+              <a:lnSpc>
+                <a:spcPct val="100000"/>
+              </a:lnSpc>
+              <a:spcAft>
+                <a:spcPts val="0"/>
+              </a:spcAft>
+              <a:buFont typeface="Arial" panose="020B0604020202020204" pitchFamily="34" charset="0"/>
+              <a:buChar char="•"/>
+            </a:pPr>
+            <a:endParaRPr lang="en-US" dirty="0"/>
+          </a:p>
+          <a:p>
+            <a:pPr marL="457200" indent="-457200">
+              <a:lnSpc>
+                <a:spcPct val="100000"/>
+              </a:lnSpc>
+              <a:spcAft>
+                <a:spcPts val="0"/>
+              </a:spcAft>
+              <a:buFont typeface="Arial" panose="020B0604020202020204" pitchFamily="34" charset="0"/>
+              <a:buChar char="•"/>
+            </a:pPr>
+            <a:r>
+              <a:rPr lang="en-US" dirty="0"/>
+              <a:t>Be careful choosing selectors as not to change all global styles unless purposefully</a:t>
+            </a:r>
+          </a:p>
+          <a:p>
+            <a:pPr marL="457200" indent="-457200">
+              <a:lnSpc>
+                <a:spcPct val="100000"/>
+              </a:lnSpc>
+              <a:spcAft>
+                <a:spcPts val="0"/>
+              </a:spcAft>
+              <a:buFont typeface="Arial" panose="020B0604020202020204" pitchFamily="34" charset="0"/>
+              <a:buChar char="•"/>
+            </a:pPr>
+            <a:r>
+              <a:rPr lang="en-US" dirty="0"/>
+              <a:t>Following a property value with </a:t>
+            </a:r>
+            <a:r>
+              <a:rPr lang="en-US" dirty="0">
+                <a:solidFill>
+                  <a:srgbClr val="C00000"/>
+                </a:solidFill>
+              </a:rPr>
+              <a:t>!important </a:t>
+            </a:r>
+            <a:r>
+              <a:rPr lang="en-US" dirty="0"/>
+              <a:t>can be used to overrule the specificity but should not be used lightly</a:t>
+            </a:r>
+          </a:p>
+          <a:p>
+            <a:pPr marL="457200" indent="-457200">
+              <a:lnSpc>
+                <a:spcPct val="100000"/>
+              </a:lnSpc>
+              <a:spcAft>
+                <a:spcPts val="0"/>
+              </a:spcAft>
+              <a:buFont typeface="Arial" panose="020B0604020202020204" pitchFamily="34" charset="0"/>
+              <a:buChar char="•"/>
+            </a:pPr>
+            <a:endParaRPr lang="en-US" dirty="0"/>
+          </a:p>
+        </p:txBody>
+      </p:sp>
+    </p:spTree>
+    <p:extLst>
+      <p:ext uri="{BB962C8B-B14F-4D97-AF65-F5344CB8AC3E}">
+        <p14:creationId xmlns:p14="http://schemas.microsoft.com/office/powerpoint/2010/main" val="879691231"/>
+      </p:ext>
+    </p:extLst>
+  </p:cSld>
+  <p:clrMapOvr>
+    <a:masterClrMapping/>
+  </p:clrMapOvr>
+</p:sld>
+</file>
+
+<file path=ppt/slides/slide6.xml><?xml version="1.0" encoding="utf-8"?>
+<p:sld xmlns:a="http://schemas.openxmlformats.org/drawingml/2006/main" xmlns:r="http://schemas.openxmlformats.org/officeDocument/2006/relationships" xmlns:p="http://schemas.openxmlformats.org/presentationml/2006/main">
+  <p:cSld>
+    <p:spTree>
+      <p:nvGrpSpPr>
+        <p:cNvPr id="1" name=""/>
+        <p:cNvGrpSpPr/>
+        <p:nvPr/>
+      </p:nvGrpSpPr>
+      <p:grpSpPr>
+        <a:xfrm>
+          <a:off x="0" y="0"/>
+          <a:ext cx="0" cy="0"/>
+          <a:chOff x="0" y="0"/>
+          <a:chExt cx="0" cy="0"/>
+        </a:xfrm>
+      </p:grpSpPr>
+      <p:sp>
+        <p:nvSpPr>
+          <p:cNvPr id="2" name="Title 1">
+            <a:extLst>
+              <a:ext uri="{FF2B5EF4-FFF2-40B4-BE49-F238E27FC236}">
+                <a16:creationId xmlns:a16="http://schemas.microsoft.com/office/drawing/2014/main" id="{1AAA912E-0B65-4468-973A-E8B66F85A70D}"/>
+              </a:ext>
+            </a:extLst>
+          </p:cNvPr>
+          <p:cNvSpPr>
+            <a:spLocks noGrp="1"/>
+          </p:cNvSpPr>
+          <p:nvPr>
+            <p:ph type="title"/>
+          </p:nvPr>
+        </p:nvSpPr>
+        <p:spPr/>
+        <p:txBody>
+          <a:bodyPr/>
+          <a:lstStyle/>
+          <a:p>
+            <a:r>
+              <a:rPr lang="en-US" dirty="0"/>
               <a:t>Inheritance</a:t>
             </a:r>
           </a:p>
@@ -6014,7 +6470,7 @@
 </p:sld>
 </file>
 
-<file path=ppt/slides/slide6.xml><?xml version="1.0" encoding="utf-8"?>
+<file path=ppt/slides/slide7.xml><?xml version="1.0" encoding="utf-8"?>
 <p:sld xmlns:a="http://schemas.openxmlformats.org/drawingml/2006/main" xmlns:r="http://schemas.openxmlformats.org/officeDocument/2006/relationships" xmlns:p="http://schemas.openxmlformats.org/presentationml/2006/main">
   <p:cSld>
     <p:bg>
@@ -6413,7 +6869,7 @@
 </p:sld>
 </file>
 
-<file path=ppt/slides/slide7.xml><?xml version="1.0" encoding="utf-8"?>
+<file path=ppt/slides/slide8.xml><?xml version="1.0" encoding="utf-8"?>
 <p:sld xmlns:a="http://schemas.openxmlformats.org/drawingml/2006/main" xmlns:r="http://schemas.openxmlformats.org/officeDocument/2006/relationships" xmlns:p="http://schemas.openxmlformats.org/presentationml/2006/main">
   <p:cSld>
     <p:bg>
@@ -6547,7 +7003,7 @@
 </p:sld>
 </file>
 
-<file path=ppt/slides/slide8.xml><?xml version="1.0" encoding="utf-8"?>
+<file path=ppt/slides/slide9.xml><?xml version="1.0" encoding="utf-8"?>
 <p:sld xmlns:a="http://schemas.openxmlformats.org/drawingml/2006/main" xmlns:r="http://schemas.openxmlformats.org/officeDocument/2006/relationships" xmlns:p="http://schemas.openxmlformats.org/presentationml/2006/main">
   <p:cSld>
     <p:spTree>
@@ -6615,83 +7071,6 @@
     <p:extLst>
       <p:ext uri="{BB962C8B-B14F-4D97-AF65-F5344CB8AC3E}">
         <p14:creationId xmlns:p14="http://schemas.microsoft.com/office/powerpoint/2010/main" val="1535232267"/>
-      </p:ext>
-    </p:extLst>
-  </p:cSld>
-  <p:clrMapOvr>
-    <a:masterClrMapping/>
-  </p:clrMapOvr>
-</p:sld>
-</file>
-
-<file path=ppt/slides/slide9.xml><?xml version="1.0" encoding="utf-8"?>
-<p:sld xmlns:a="http://schemas.openxmlformats.org/drawingml/2006/main" xmlns:r="http://schemas.openxmlformats.org/officeDocument/2006/relationships" xmlns:p="http://schemas.openxmlformats.org/presentationml/2006/main">
-  <p:cSld>
-    <p:spTree>
-      <p:nvGrpSpPr>
-        <p:cNvPr id="1" name=""/>
-        <p:cNvGrpSpPr/>
-        <p:nvPr/>
-      </p:nvGrpSpPr>
-      <p:grpSpPr>
-        <a:xfrm>
-          <a:off x="0" y="0"/>
-          <a:ext cx="0" cy="0"/>
-          <a:chOff x="0" y="0"/>
-          <a:chExt cx="0" cy="0"/>
-        </a:xfrm>
-      </p:grpSpPr>
-      <p:pic>
-        <p:nvPicPr>
-          <p:cNvPr id="5122" name="Picture 2" descr="CSS Position | Learn Three Sets of Properties in CSS Position">
-            <a:extLst>
-              <a:ext uri="{FF2B5EF4-FFF2-40B4-BE49-F238E27FC236}">
-                <a16:creationId xmlns:a16="http://schemas.microsoft.com/office/drawing/2014/main" id="{4B487F10-A1ED-47BA-9882-5FA552A4659D}"/>
-              </a:ext>
-            </a:extLst>
-          </p:cNvPr>
-          <p:cNvPicPr>
-            <a:picLocks noChangeAspect="1" noChangeArrowheads="1"/>
-          </p:cNvPicPr>
-          <p:nvPr/>
-        </p:nvPicPr>
-        <p:blipFill>
-          <a:blip r:embed="rId2">
-            <a:extLst>
-              <a:ext uri="{28A0092B-C50C-407E-A947-70E740481C1C}">
-                <a14:useLocalDpi xmlns:a14="http://schemas.microsoft.com/office/drawing/2010/main" val="0"/>
-              </a:ext>
-            </a:extLst>
-          </a:blip>
-          <a:srcRect/>
-          <a:stretch>
-            <a:fillRect/>
-          </a:stretch>
-        </p:blipFill>
-        <p:spPr bwMode="auto">
-          <a:xfrm>
-            <a:off x="0" y="0"/>
-            <a:ext cx="12301538" cy="6858000"/>
-          </a:xfrm>
-          <a:prstGeom prst="rect">
-            <a:avLst/>
-          </a:prstGeom>
-          <a:noFill/>
-          <a:extLst>
-            <a:ext uri="{909E8E84-426E-40DD-AFC4-6F175D3DCCD1}">
-              <a14:hiddenFill xmlns:a14="http://schemas.microsoft.com/office/drawing/2010/main">
-                <a:solidFill>
-                  <a:srgbClr val="FFFFFF"/>
-                </a:solidFill>
-              </a14:hiddenFill>
-            </a:ext>
-          </a:extLst>
-        </p:spPr>
-      </p:pic>
-    </p:spTree>
-    <p:extLst>
-      <p:ext uri="{BB962C8B-B14F-4D97-AF65-F5344CB8AC3E}">
-        <p14:creationId xmlns:p14="http://schemas.microsoft.com/office/powerpoint/2010/main" val="2009543672"/>
       </p:ext>
     </p:extLst>
   </p:cSld>

</xml_diff>